<commit_message>
new slide for presentation
Project 4
</commit_message>
<xml_diff>
--- a/project 4 presentation.pptx
+++ b/project 4 presentation.pptx
@@ -7,10 +7,10 @@
   <p:sldIdLst>
     <p:sldId id="256" r:id="rId2"/>
     <p:sldId id="257" r:id="rId3"/>
-    <p:sldId id="267" r:id="rId4"/>
-    <p:sldId id="268" r:id="rId5"/>
-    <p:sldId id="264" r:id="rId6"/>
-    <p:sldId id="258" r:id="rId7"/>
+    <p:sldId id="258" r:id="rId4"/>
+    <p:sldId id="267" r:id="rId5"/>
+    <p:sldId id="268" r:id="rId6"/>
+    <p:sldId id="264" r:id="rId7"/>
     <p:sldId id="259" r:id="rId8"/>
     <p:sldId id="260" r:id="rId9"/>
     <p:sldId id="270" r:id="rId10"/>
@@ -5815,7 +5815,7 @@
           <a:p>
             <a:fld id="{073D55F9-11A3-4523-8F38-6BA37933791A}" type="datetime1">
               <a:rPr lang="en-US" smtClean="0"/>
-              <a:t>5/15/2023</a:t>
+              <a:t>5/16/2023</a:t>
             </a:fld>
             <a:endParaRPr lang="en-US"/>
           </a:p>
@@ -6094,7 +6094,7 @@
             <a:fld id="{193BAB95-8DA7-460B-B00A-7037C8394FB0}" type="datetime1">
               <a:rPr lang="en-US" smtClean="0"/>
               <a:pPr/>
-              <a:t>5/15/2023</a:t>
+              <a:t>5/16/2023</a:t>
             </a:fld>
             <a:endParaRPr lang="en-US" dirty="0"/>
           </a:p>
@@ -6299,7 +6299,7 @@
             <a:fld id="{193BAB95-8DA7-460B-B00A-7037C8394FB0}" type="datetime1">
               <a:rPr lang="en-US" smtClean="0"/>
               <a:pPr/>
-              <a:t>5/15/2023</a:t>
+              <a:t>5/16/2023</a:t>
             </a:fld>
             <a:endParaRPr lang="en-US" dirty="0"/>
           </a:p>
@@ -6578,7 +6578,7 @@
             <a:fld id="{193BAB95-8DA7-460B-B00A-7037C8394FB0}" type="datetime1">
               <a:rPr lang="en-US" smtClean="0"/>
               <a:pPr/>
-              <a:t>5/15/2023</a:t>
+              <a:t>5/16/2023</a:t>
             </a:fld>
             <a:endParaRPr lang="en-US" dirty="0"/>
           </a:p>
@@ -6921,7 +6921,7 @@
             <a:fld id="{193BAB95-8DA7-460B-B00A-7037C8394FB0}" type="datetime1">
               <a:rPr lang="en-US" smtClean="0"/>
               <a:pPr/>
-              <a:t>5/15/2023</a:t>
+              <a:t>5/16/2023</a:t>
             </a:fld>
             <a:endParaRPr lang="en-US" dirty="0"/>
           </a:p>
@@ -7542,7 +7542,7 @@
             <a:fld id="{193BAB95-8DA7-460B-B00A-7037C8394FB0}" type="datetime1">
               <a:rPr lang="en-US" smtClean="0"/>
               <a:pPr/>
-              <a:t>5/15/2023</a:t>
+              <a:t>5/16/2023</a:t>
             </a:fld>
             <a:endParaRPr lang="en-US" dirty="0"/>
           </a:p>
@@ -8400,7 +8400,7 @@
             <a:fld id="{193BAB95-8DA7-460B-B00A-7037C8394FB0}" type="datetime1">
               <a:rPr lang="en-US" smtClean="0"/>
               <a:pPr/>
-              <a:t>5/15/2023</a:t>
+              <a:t>5/16/2023</a:t>
             </a:fld>
             <a:endParaRPr lang="en-US" dirty="0"/>
           </a:p>
@@ -8580,7 +8580,7 @@
           <a:p>
             <a:fld id="{0B4E757A-3EC2-4683-9080-1A460C37C843}" type="datetime1">
               <a:rPr lang="en-US" smtClean="0"/>
-              <a:t>5/15/2023</a:t>
+              <a:t>5/16/2023</a:t>
             </a:fld>
             <a:endParaRPr lang="en-US"/>
           </a:p>
@@ -8763,7 +8763,7 @@
           <a:p>
             <a:fld id="{5CC8096C-64ED-4153-A483-5C02E44AD5C3}" type="datetime1">
               <a:rPr lang="en-US" smtClean="0"/>
-              <a:t>5/15/2023</a:t>
+              <a:t>5/16/2023</a:t>
             </a:fld>
             <a:endParaRPr lang="en-US" dirty="0"/>
           </a:p>
@@ -8936,7 +8936,7 @@
           <a:p>
             <a:fld id="{1CB9D56B-6EBE-4E5F-99D9-2A3DBDF37D0A}" type="datetime1">
               <a:rPr lang="en-US" smtClean="0"/>
-              <a:t>5/15/2023</a:t>
+              <a:t>5/16/2023</a:t>
             </a:fld>
             <a:endParaRPr lang="en-US"/>
           </a:p>
@@ -9183,7 +9183,7 @@
           <a:p>
             <a:fld id="{8C33F3CA-C7E3-432D-9282-18F13836509A}" type="datetime1">
               <a:rPr lang="en-US" smtClean="0"/>
-              <a:t>5/15/2023</a:t>
+              <a:t>5/16/2023</a:t>
             </a:fld>
             <a:endParaRPr lang="en-US" dirty="0"/>
           </a:p>
@@ -9478,7 +9478,7 @@
           <a:p>
             <a:fld id="{75BE9C62-1337-40B8-BA50-E9F4861DB4BC}" type="datetime1">
               <a:rPr lang="en-US" smtClean="0"/>
-              <a:t>5/15/2023</a:t>
+              <a:t>5/16/2023</a:t>
             </a:fld>
             <a:endParaRPr lang="en-US"/>
           </a:p>
@@ -9919,7 +9919,7 @@
           <a:p>
             <a:fld id="{47C195EB-2DA3-4B24-8725-19BC22A7BE50}" type="datetime1">
               <a:rPr lang="en-US" smtClean="0"/>
-              <a:t>5/15/2023</a:t>
+              <a:t>5/16/2023</a:t>
             </a:fld>
             <a:endParaRPr lang="en-US"/>
           </a:p>
@@ -10040,7 +10040,7 @@
           <a:p>
             <a:fld id="{F4E237E6-0076-4915-A5A8-B7C11FA4F374}" type="datetime1">
               <a:rPr lang="en-US" smtClean="0"/>
-              <a:t>5/15/2023</a:t>
+              <a:t>5/16/2023</a:t>
             </a:fld>
             <a:endParaRPr lang="en-US"/>
           </a:p>
@@ -10138,7 +10138,7 @@
           <a:p>
             <a:fld id="{3505F58F-C0B5-422A-8E5A-6B99E5D80F0A}" type="datetime1">
               <a:rPr lang="en-US" smtClean="0"/>
-              <a:t>5/15/2023</a:t>
+              <a:t>5/16/2023</a:t>
             </a:fld>
             <a:endParaRPr lang="en-US"/>
           </a:p>
@@ -10420,7 +10420,7 @@
           <a:p>
             <a:fld id="{7565E655-9687-48DF-A33F-F8824CCCB5D1}" type="datetime1">
               <a:rPr lang="en-US" smtClean="0"/>
-              <a:t>5/15/2023</a:t>
+              <a:t>5/16/2023</a:t>
             </a:fld>
             <a:endParaRPr lang="en-US"/>
           </a:p>
@@ -10698,7 +10698,7 @@
           <a:p>
             <a:fld id="{B97FD56A-AAB8-4544-A495-D0645413C9E3}" type="datetime1">
               <a:rPr lang="en-US" smtClean="0"/>
-              <a:t>5/15/2023</a:t>
+              <a:t>5/16/2023</a:t>
             </a:fld>
             <a:endParaRPr lang="en-US"/>
           </a:p>
@@ -11131,7 +11131,7 @@
             <a:fld id="{193BAB95-8DA7-460B-B00A-7037C8394FB0}" type="datetime1">
               <a:rPr lang="en-US" smtClean="0"/>
               <a:pPr/>
-              <a:t>5/15/2023</a:t>
+              <a:t>5/16/2023</a:t>
             </a:fld>
             <a:endParaRPr lang="en-US" dirty="0"/>
           </a:p>
@@ -12908,17 +12908,10 @@
               </a:lnSpc>
             </a:pPr>
             <a:r>
-              <a:rPr lang="en-US" sz="1600" dirty="0">
-                <a:latin typeface="source-serif-pro"/>
+              <a:rPr lang="en-US" sz="1400" dirty="0">
+                <a:latin typeface="Arial Rounded MT Bold" panose="020B0604020202020204" pitchFamily="34" charset="0"/>
               </a:rPr>
-              <a:t>C</a:t>
-            </a:r>
-            <a:r>
-              <a:rPr lang="en-US" sz="1600" b="0" dirty="0">
-                <a:effectLst/>
-                <a:latin typeface="source-serif-pro"/>
-              </a:rPr>
-              <a:t>lassification problems in the real world are imbalanced. Also, almost  data sets have missing values. There is no definitive guide of which algorithms to use given any situation. What may work on some data sets may not necessarily work on others. In some classification problems, False Negatives are a lot more expensive than False Positives. Usually, Missing values sometimes add more information to the model than we might expect. </a:t>
+              <a:t>We used three machine learning models. </a:t>
             </a:r>
           </a:p>
           <a:p>
@@ -12928,15 +12921,17 @@
               </a:lnSpc>
             </a:pPr>
             <a:r>
-              <a:rPr lang="en-US" sz="1600" dirty="0">
-                <a:latin typeface="source-serif-pro"/>
+              <a:rPr lang="en-US" sz="1400" dirty="0">
+                <a:latin typeface="Arial Rounded MT Bold" panose="020B0604020202020204" pitchFamily="34" charset="0"/>
               </a:rPr>
-              <a:t>We checked and used three machine learning models, out of those three models would recommend SVM model due to high accuracy.</a:t>
-            </a:r>
-            <a:endParaRPr lang="en-US" sz="1600" b="0" dirty="0">
-              <a:effectLst/>
-              <a:latin typeface="source-serif-pro"/>
-            </a:endParaRPr>
+              <a:t>Out of three models, </a:t>
+            </a:r>
+            <a:r>
+              <a:rPr lang="en-AU" sz="1400" dirty="0">
+                <a:latin typeface="Arial Rounded MT Bold" panose="020B0604020202020204" pitchFamily="34" charset="0"/>
+              </a:rPr>
+              <a:t>SVM model is recommended compared to other models  due to much higher precession and recall score for default loan and successful loans. Means this is more accurately classify all for both predictions. </a:t>
+            </a:r>
           </a:p>
           <a:p>
             <a:pPr>
@@ -12944,10 +12939,26 @@
                 <a:spcPct val="90000"/>
               </a:lnSpc>
             </a:pPr>
-            <a:endParaRPr lang="en-US" sz="1600" b="0" i="0" dirty="0">
-              <a:effectLst/>
-              <a:latin typeface="source-serif-pro"/>
-            </a:endParaRPr>
+            <a:r>
+              <a:rPr lang="en-AU" sz="1400" dirty="0">
+                <a:latin typeface="Arial Rounded MT Bold" panose="020B0604020202020204" pitchFamily="34" charset="0"/>
+              </a:rPr>
+              <a:t>Overall, SVM has dominant performance in accuracy. This is useful if we want to use the model to determine if a loan is potentially default or not. </a:t>
+            </a:r>
+          </a:p>
+          <a:p>
+            <a:r>
+              <a:rPr lang="en-US" sz="1400" dirty="0">
+                <a:latin typeface="Arial Rounded MT Bold" panose="020B0604020202020204" pitchFamily="34" charset="0"/>
+              </a:rPr>
+              <a:t>Classification problems in the real world are imbalanced. Also,  data sets may have missing values. There is no definitive guide of which algorithms to use given any situation. What may work on some data sets may not work on others. </a:t>
+            </a:r>
+            <a:r>
+              <a:rPr lang="en-AU" sz="1400" dirty="0">
+                <a:latin typeface="Arial Rounded MT Bold" panose="020B0604020202020204" pitchFamily="34" charset="0"/>
+              </a:rPr>
+              <a:t>Still there could be incorrect predictions such as false positives and false negatives.</a:t>
+            </a:r>
           </a:p>
           <a:p>
             <a:pPr marL="0" indent="0">
@@ -13081,6 +13092,153 @@
                       </p:childTnLst>
                     </p:cTn>
                   </p:par>
+                  <p:par>
+                    <p:cTn id="11" fill="hold">
+                      <p:stCondLst>
+                        <p:cond delay="indefinite"/>
+                      </p:stCondLst>
+                      <p:childTnLst>
+                        <p:par>
+                          <p:cTn id="12" fill="hold">
+                            <p:stCondLst>
+                              <p:cond delay="0"/>
+                            </p:stCondLst>
+                            <p:childTnLst>
+                              <p:par>
+                                <p:cTn id="13" presetID="1" presetClass="entr" presetSubtype="0" fill="hold" grpId="0" nodeType="clickEffect">
+                                  <p:stCondLst>
+                                    <p:cond delay="0"/>
+                                  </p:stCondLst>
+                                  <p:childTnLst>
+                                    <p:set>
+                                      <p:cBhvr>
+                                        <p:cTn id="14" dur="1" fill="hold">
+                                          <p:stCondLst>
+                                            <p:cond delay="0"/>
+                                          </p:stCondLst>
+                                        </p:cTn>
+                                        <p:tgtEl>
+                                          <p:spTgt spid="27">
+                                            <p:txEl>
+                                              <p:pRg st="2" end="2"/>
+                                            </p:txEl>
+                                          </p:spTgt>
+                                        </p:tgtEl>
+                                        <p:attrNameLst>
+                                          <p:attrName>style.visibility</p:attrName>
+                                        </p:attrNameLst>
+                                      </p:cBhvr>
+                                      <p:to>
+                                        <p:strVal val="visible"/>
+                                      </p:to>
+                                    </p:set>
+                                  </p:childTnLst>
+                                </p:cTn>
+                              </p:par>
+                            </p:childTnLst>
+                          </p:cTn>
+                        </p:par>
+                      </p:childTnLst>
+                    </p:cTn>
+                  </p:par>
+                  <p:par>
+                    <p:cTn id="15" fill="hold">
+                      <p:stCondLst>
+                        <p:cond delay="indefinite"/>
+                      </p:stCondLst>
+                      <p:childTnLst>
+                        <p:par>
+                          <p:cTn id="16" fill="hold">
+                            <p:stCondLst>
+                              <p:cond delay="0"/>
+                            </p:stCondLst>
+                            <p:childTnLst>
+                              <p:par>
+                                <p:cTn id="17" presetID="1" presetClass="entr" presetSubtype="0" fill="hold" grpId="0" nodeType="clickEffect">
+                                  <p:stCondLst>
+                                    <p:cond delay="0"/>
+                                  </p:stCondLst>
+                                  <p:childTnLst>
+                                    <p:set>
+                                      <p:cBhvr>
+                                        <p:cTn id="18" dur="1" fill="hold">
+                                          <p:stCondLst>
+                                            <p:cond delay="0"/>
+                                          </p:stCondLst>
+                                        </p:cTn>
+                                        <p:tgtEl>
+                                          <p:spTgt spid="27">
+                                            <p:txEl>
+                                              <p:pRg st="3" end="3"/>
+                                            </p:txEl>
+                                          </p:spTgt>
+                                        </p:tgtEl>
+                                        <p:attrNameLst>
+                                          <p:attrName>style.visibility</p:attrName>
+                                        </p:attrNameLst>
+                                      </p:cBhvr>
+                                      <p:to>
+                                        <p:strVal val="visible"/>
+                                      </p:to>
+                                    </p:set>
+                                  </p:childTnLst>
+                                </p:cTn>
+                              </p:par>
+                            </p:childTnLst>
+                          </p:cTn>
+                        </p:par>
+                      </p:childTnLst>
+                    </p:cTn>
+                  </p:par>
+                  <p:par>
+                    <p:cTn id="19" fill="hold">
+                      <p:stCondLst>
+                        <p:cond delay="indefinite"/>
+                      </p:stCondLst>
+                      <p:childTnLst>
+                        <p:par>
+                          <p:cTn id="20" fill="hold">
+                            <p:stCondLst>
+                              <p:cond delay="0"/>
+                            </p:stCondLst>
+                            <p:childTnLst>
+                              <p:par>
+                                <p:cTn id="21" presetID="1" presetClass="entr" presetSubtype="0" fill="hold" grpId="0" nodeType="clickEffect">
+                                  <p:stCondLst>
+                                    <p:cond delay="0"/>
+                                  </p:stCondLst>
+                                  <p:childTnLst>
+                                    <p:set>
+                                      <p:cBhvr>
+                                        <p:cTn id="22" dur="1" fill="hold">
+                                          <p:stCondLst>
+                                            <p:cond delay="0"/>
+                                          </p:stCondLst>
+                                        </p:cTn>
+                                        <p:tgtEl>
+                                          <p:spTgt spid="27">
+                                            <p:txEl>
+                                              <p:pRg st="4" end="4"/>
+                                            </p:txEl>
+                                          </p:spTgt>
+                                        </p:tgtEl>
+                                        <p:attrNameLst>
+                                          <p:attrName>style.visibility</p:attrName>
+                                        </p:attrNameLst>
+                                      </p:cBhvr>
+                                      <p:to>
+                                        <p:strVal val="visible"/>
+                                      </p:to>
+                                    </p:set>
+                                  </p:childTnLst>
+                                </p:cTn>
+                              </p:par>
+                            </p:childTnLst>
+                          </p:cTn>
+                        </p:par>
+                      </p:childTnLst>
+                    </p:cTn>
+                  </p:par>
                 </p:childTnLst>
               </p:cTn>
               <p:prevCondLst>
@@ -13175,7 +13333,7 @@
             <p:ph idx="1"/>
             <p:extLst>
               <p:ext uri="{D42A27DB-BD31-4B8C-83A1-F6EECF244321}">
-                <p14:modId xmlns:p14="http://schemas.microsoft.com/office/powerpoint/2010/main" val="1293890824"/>
+                <p14:modId xmlns:p14="http://schemas.microsoft.com/office/powerpoint/2010/main" val="832643256"/>
               </p:ext>
             </p:extLst>
           </p:nvPr>
@@ -13227,7 +13385,7 @@
                     <a:p>
                       <a:r>
                         <a:rPr lang="en-AU" dirty="0"/>
-                        <a:t>Responsibilities</a:t>
+                        <a:t>Tasks &amp; Responsibilities</a:t>
                       </a:r>
                     </a:p>
                   </a:txBody>
@@ -13569,6 +13727,879 @@
 </file>
 
 <file path=ppt/slides/slide3.xml><?xml version="1.0" encoding="utf-8"?>
+<p:sld xmlns:a="http://schemas.openxmlformats.org/drawingml/2006/main" xmlns:r="http://schemas.openxmlformats.org/officeDocument/2006/relationships" xmlns:p="http://schemas.openxmlformats.org/presentationml/2006/main">
+  <p:cSld>
+    <p:bg>
+      <p:bgPr>
+        <a:solidFill>
+          <a:schemeClr val="bg1"/>
+        </a:solidFill>
+        <a:effectLst/>
+      </p:bgPr>
+    </p:bg>
+    <p:spTree>
+      <p:nvGrpSpPr>
+        <p:cNvPr id="1" name=""/>
+        <p:cNvGrpSpPr/>
+        <p:nvPr/>
+      </p:nvGrpSpPr>
+      <p:grpSpPr>
+        <a:xfrm>
+          <a:off x="0" y="0"/>
+          <a:ext cx="0" cy="0"/>
+          <a:chOff x="0" y="0"/>
+          <a:chExt cx="0" cy="0"/>
+        </a:xfrm>
+      </p:grpSpPr>
+      <p:sp>
+        <p:nvSpPr>
+          <p:cNvPr id="2" name="Title 1">
+            <a:extLst>
+              <a:ext uri="{FF2B5EF4-FFF2-40B4-BE49-F238E27FC236}">
+                <a16:creationId xmlns:a16="http://schemas.microsoft.com/office/drawing/2014/main" id="{E31D61D9-9039-133C-C496-C82302AA706C}"/>
+              </a:ext>
+            </a:extLst>
+          </p:cNvPr>
+          <p:cNvSpPr>
+            <a:spLocks noGrp="1"/>
+          </p:cNvSpPr>
+          <p:nvPr>
+            <p:ph type="title"/>
+          </p:nvPr>
+        </p:nvSpPr>
+        <p:spPr>
+          <a:xfrm>
+            <a:off x="789965" y="725467"/>
+            <a:ext cx="4952999" cy="1580411"/>
+          </a:xfrm>
+        </p:spPr>
+        <p:txBody>
+          <a:bodyPr>
+            <a:normAutofit/>
+          </a:bodyPr>
+          <a:lstStyle/>
+          <a:p>
+            <a:r>
+              <a:rPr lang="en-AU" dirty="0"/>
+              <a:t>Introduction</a:t>
+            </a:r>
+          </a:p>
+        </p:txBody>
+      </p:sp>
+      <p:sp>
+        <p:nvSpPr>
+          <p:cNvPr id="3" name="Content Placeholder 2">
+            <a:extLst>
+              <a:ext uri="{FF2B5EF4-FFF2-40B4-BE49-F238E27FC236}">
+                <a16:creationId xmlns:a16="http://schemas.microsoft.com/office/drawing/2014/main" id="{BB59DD5E-5F10-A0B7-AE54-62FF24BCDA43}"/>
+              </a:ext>
+            </a:extLst>
+          </p:cNvPr>
+          <p:cNvSpPr>
+            <a:spLocks noGrp="1"/>
+          </p:cNvSpPr>
+          <p:nvPr>
+            <p:ph idx="1"/>
+          </p:nvPr>
+        </p:nvSpPr>
+        <p:spPr>
+          <a:xfrm>
+            <a:off x="457200" y="2001078"/>
+            <a:ext cx="4952999" cy="4131455"/>
+          </a:xfrm>
+        </p:spPr>
+        <p:txBody>
+          <a:bodyPr>
+            <a:normAutofit/>
+          </a:bodyPr>
+          <a:lstStyle/>
+          <a:p>
+            <a:pPr marL="0" indent="0">
+              <a:lnSpc>
+                <a:spcPct val="100000"/>
+              </a:lnSpc>
+              <a:buNone/>
+            </a:pPr>
+            <a:endParaRPr lang="en-US" sz="1000" b="1" i="0" dirty="0">
+              <a:effectLst/>
+              <a:latin typeface="sohne"/>
+            </a:endParaRPr>
+          </a:p>
+          <a:p>
+            <a:pPr>
+              <a:lnSpc>
+                <a:spcPct val="100000"/>
+              </a:lnSpc>
+            </a:pPr>
+            <a:r>
+              <a:rPr lang="en-US" sz="1400" b="0" i="0" dirty="0">
+                <a:effectLst/>
+                <a:latin typeface="source-serif-pro"/>
+              </a:rPr>
+              <a:t>The two critical questions in the lending industry are</a:t>
+            </a:r>
+            <a:r>
+              <a:rPr lang="en-US" sz="1400" dirty="0">
+                <a:latin typeface="source-serif-pro"/>
+              </a:rPr>
+              <a:t>,  </a:t>
+            </a:r>
+            <a:r>
+              <a:rPr lang="en-US" sz="1400" b="0" i="0" dirty="0">
+                <a:effectLst/>
+                <a:latin typeface="source-serif-pro"/>
+              </a:rPr>
+              <a:t>A) What </a:t>
+            </a:r>
+            <a:r>
+              <a:rPr lang="en-US" sz="1400" dirty="0">
+                <a:latin typeface="source-serif-pro"/>
+              </a:rPr>
+              <a:t>type </a:t>
+            </a:r>
+            <a:r>
+              <a:rPr lang="en-US" sz="1400" b="0" i="0" dirty="0">
+                <a:effectLst/>
+                <a:latin typeface="source-serif-pro"/>
+              </a:rPr>
+              <a:t>of the borrower we are going to serve? B) </a:t>
+            </a:r>
+            <a:r>
+              <a:rPr lang="en-US" sz="1400" dirty="0">
+                <a:latin typeface="source-serif-pro"/>
+              </a:rPr>
+              <a:t>Considering </a:t>
+            </a:r>
+            <a:r>
+              <a:rPr lang="en-US" sz="1400" b="0" i="0" dirty="0">
+                <a:effectLst/>
+                <a:latin typeface="source-serif-pro"/>
+              </a:rPr>
+              <a:t>the borrower’s risk, Could we lend </a:t>
+            </a:r>
+            <a:r>
+              <a:rPr lang="en-US" sz="1400" dirty="0">
+                <a:latin typeface="source-serif-pro"/>
+              </a:rPr>
+              <a:t>to this  borrower</a:t>
+            </a:r>
+            <a:r>
+              <a:rPr lang="en-US" sz="1400" b="0" i="0" dirty="0">
+                <a:effectLst/>
+                <a:latin typeface="source-serif-pro"/>
+              </a:rPr>
+              <a:t>?</a:t>
+            </a:r>
+          </a:p>
+          <a:p>
+            <a:pPr>
+              <a:lnSpc>
+                <a:spcPct val="100000"/>
+              </a:lnSpc>
+            </a:pPr>
+            <a:r>
+              <a:rPr lang="en-US" sz="1400" b="0" i="0" dirty="0">
+                <a:effectLst/>
+                <a:latin typeface="source-serif-pro"/>
+              </a:rPr>
+              <a:t> Lenders provide loans to borrowers in exchange </a:t>
+            </a:r>
+            <a:r>
+              <a:rPr lang="en-US" sz="1400" dirty="0">
+                <a:latin typeface="source-serif-pro"/>
+              </a:rPr>
+              <a:t>for </a:t>
+            </a:r>
+            <a:r>
+              <a:rPr lang="en-US" sz="1400" b="0" i="0" dirty="0">
+                <a:effectLst/>
+                <a:latin typeface="source-serif-pro"/>
+              </a:rPr>
+              <a:t>repayment with capital and interest. </a:t>
+            </a:r>
+            <a:r>
+              <a:rPr lang="en-US" sz="1400" dirty="0">
+                <a:latin typeface="source-serif-pro"/>
+              </a:rPr>
+              <a:t>M</a:t>
+            </a:r>
+            <a:r>
+              <a:rPr lang="en-US" sz="1400" b="0" i="0" dirty="0">
+                <a:effectLst/>
+                <a:latin typeface="source-serif-pro"/>
+              </a:rPr>
+              <a:t>eans the lender only makes profit if the borrower pays off the loan in full on time. However, if </a:t>
+            </a:r>
+            <a:r>
+              <a:rPr lang="en-US" sz="1400" dirty="0">
+                <a:latin typeface="source-serif-pro"/>
+              </a:rPr>
+              <a:t>borrower </a:t>
+            </a:r>
+            <a:r>
+              <a:rPr lang="en-US" sz="1400" b="0" i="0" dirty="0">
+                <a:effectLst/>
+                <a:latin typeface="source-serif-pro"/>
+              </a:rPr>
+              <a:t>doesn’t repay the loan, then the lender loses money. </a:t>
+            </a:r>
+          </a:p>
+          <a:p>
+            <a:pPr>
+              <a:lnSpc>
+                <a:spcPct val="100000"/>
+              </a:lnSpc>
+            </a:pPr>
+            <a:r>
+              <a:rPr lang="en-US" sz="1400" b="0" i="0" dirty="0">
+                <a:effectLst/>
+                <a:latin typeface="source-serif-pro"/>
+              </a:rPr>
+              <a:t>So, for this project We’ll be using publicly available data from </a:t>
+            </a:r>
+            <a:r>
+              <a:rPr lang="en-US" sz="1400" u="sng" dirty="0">
+                <a:latin typeface="source-serif-pro"/>
+              </a:rPr>
+              <a:t>www.kaggle.com </a:t>
+            </a:r>
+            <a:r>
+              <a:rPr lang="en-US" sz="1400" b="0" i="0" dirty="0">
+                <a:effectLst/>
+                <a:latin typeface="source-serif-pro"/>
+              </a:rPr>
+              <a:t> </a:t>
+            </a:r>
+            <a:r>
+              <a:rPr lang="en-US" sz="1400" dirty="0">
+                <a:latin typeface="source-serif-pro"/>
+              </a:rPr>
+              <a:t>and </a:t>
+            </a:r>
+            <a:r>
+              <a:rPr lang="en-US" sz="1400" dirty="0">
+                <a:latin typeface="source-serif-pro"/>
+                <a:hlinkClick r:id="rId2"/>
+              </a:rPr>
+              <a:t>www.lendingclub.com</a:t>
+            </a:r>
+            <a:r>
+              <a:rPr lang="en-US" sz="1400" dirty="0">
+                <a:latin typeface="source-serif-pro"/>
+              </a:rPr>
+              <a:t> </a:t>
+            </a:r>
+          </a:p>
+          <a:p>
+            <a:pPr>
+              <a:lnSpc>
+                <a:spcPct val="100000"/>
+              </a:lnSpc>
+            </a:pPr>
+            <a:r>
+              <a:rPr lang="en-US" sz="1400" dirty="0">
+                <a:latin typeface="source-serif-pro"/>
+              </a:rPr>
+              <a:t>The </a:t>
+            </a:r>
+            <a:r>
+              <a:rPr lang="en-US" sz="1400" b="0" i="0" dirty="0">
+                <a:effectLst/>
+                <a:latin typeface="source-serif-pro"/>
+              </a:rPr>
+              <a:t>data covers the approximately 9,578 loans funded by the platform between year 2007 and 2010. Considering all, we’ll predict if the borrower will repay the loan by its mature date or not. </a:t>
+            </a:r>
+          </a:p>
+          <a:p>
+            <a:pPr>
+              <a:lnSpc>
+                <a:spcPct val="100000"/>
+              </a:lnSpc>
+            </a:pPr>
+            <a:endParaRPr lang="en-AU" sz="1000" dirty="0"/>
+          </a:p>
+        </p:txBody>
+      </p:sp>
+      <p:pic>
+        <p:nvPicPr>
+          <p:cNvPr id="53" name="Picture 4" descr="Graph">
+            <a:extLst>
+              <a:ext uri="{FF2B5EF4-FFF2-40B4-BE49-F238E27FC236}">
+                <a16:creationId xmlns:a16="http://schemas.microsoft.com/office/drawing/2014/main" id="{23387D32-7E6B-7229-2C18-5347681455FA}"/>
+              </a:ext>
+            </a:extLst>
+          </p:cNvPr>
+          <p:cNvPicPr>
+            <a:picLocks noChangeAspect="1"/>
+          </p:cNvPicPr>
+          <p:nvPr/>
+        </p:nvPicPr>
+        <p:blipFill rotWithShape="1">
+          <a:blip r:embed="rId3"/>
+          <a:srcRect l="14518" r="29652" b="1"/>
+          <a:stretch/>
+        </p:blipFill>
+        <p:spPr>
+          <a:xfrm>
+            <a:off x="6075730" y="-3440"/>
+            <a:ext cx="6129239" cy="6861439"/>
+          </a:xfrm>
+          <a:prstGeom prst="rect">
+            <a:avLst/>
+          </a:prstGeom>
+        </p:spPr>
+      </p:pic>
+    </p:spTree>
+    <p:extLst>
+      <p:ext uri="{BB962C8B-B14F-4D97-AF65-F5344CB8AC3E}">
+        <p14:creationId xmlns:p14="http://schemas.microsoft.com/office/powerpoint/2010/main" val="1323158687"/>
+      </p:ext>
+    </p:extLst>
+  </p:cSld>
+  <p:clrMapOvr>
+    <a:masterClrMapping/>
+  </p:clrMapOvr>
+  <p:timing>
+    <p:tnLst>
+      <p:par>
+        <p:cTn id="1" dur="indefinite" restart="never" nodeType="tmRoot">
+          <p:childTnLst>
+            <p:seq concurrent="1" nextAc="seek">
+              <p:cTn id="2" dur="indefinite" nodeType="mainSeq">
+                <p:childTnLst>
+                  <p:par>
+                    <p:cTn id="3" fill="hold">
+                      <p:stCondLst>
+                        <p:cond delay="indefinite"/>
+                      </p:stCondLst>
+                      <p:childTnLst>
+                        <p:par>
+                          <p:cTn id="4" fill="hold">
+                            <p:stCondLst>
+                              <p:cond delay="0"/>
+                            </p:stCondLst>
+                            <p:childTnLst>
+                              <p:par>
+                                <p:cTn id="5" presetID="2" presetClass="entr" presetSubtype="4" fill="hold" grpId="0" nodeType="clickEffect">
+                                  <p:stCondLst>
+                                    <p:cond delay="0"/>
+                                  </p:stCondLst>
+                                  <p:childTnLst>
+                                    <p:set>
+                                      <p:cBhvr>
+                                        <p:cTn id="6" dur="1" fill="hold">
+                                          <p:stCondLst>
+                                            <p:cond delay="0"/>
+                                          </p:stCondLst>
+                                        </p:cTn>
+                                        <p:tgtEl>
+                                          <p:spTgt spid="2"/>
+                                        </p:tgtEl>
+                                        <p:attrNameLst>
+                                          <p:attrName>style.visibility</p:attrName>
+                                        </p:attrNameLst>
+                                      </p:cBhvr>
+                                      <p:to>
+                                        <p:strVal val="visible"/>
+                                      </p:to>
+                                    </p:set>
+                                    <p:anim calcmode="lin" valueType="num">
+                                      <p:cBhvr additive="base">
+                                        <p:cTn id="7" dur="500" fill="hold"/>
+                                        <p:tgtEl>
+                                          <p:spTgt spid="2"/>
+                                        </p:tgtEl>
+                                        <p:attrNameLst>
+                                          <p:attrName>ppt_x</p:attrName>
+                                        </p:attrNameLst>
+                                      </p:cBhvr>
+                                      <p:tavLst>
+                                        <p:tav tm="0">
+                                          <p:val>
+                                            <p:strVal val="#ppt_x"/>
+                                          </p:val>
+                                        </p:tav>
+                                        <p:tav tm="100000">
+                                          <p:val>
+                                            <p:strVal val="#ppt_x"/>
+                                          </p:val>
+                                        </p:tav>
+                                      </p:tavLst>
+                                    </p:anim>
+                                    <p:anim calcmode="lin" valueType="num">
+                                      <p:cBhvr additive="base">
+                                        <p:cTn id="8" dur="500" fill="hold"/>
+                                        <p:tgtEl>
+                                          <p:spTgt spid="2"/>
+                                        </p:tgtEl>
+                                        <p:attrNameLst>
+                                          <p:attrName>ppt_y</p:attrName>
+                                        </p:attrNameLst>
+                                      </p:cBhvr>
+                                      <p:tavLst>
+                                        <p:tav tm="0">
+                                          <p:val>
+                                            <p:strVal val="1+#ppt_h/2"/>
+                                          </p:val>
+                                        </p:tav>
+                                        <p:tav tm="100000">
+                                          <p:val>
+                                            <p:strVal val="#ppt_y"/>
+                                          </p:val>
+                                        </p:tav>
+                                      </p:tavLst>
+                                    </p:anim>
+                                  </p:childTnLst>
+                                </p:cTn>
+                              </p:par>
+                            </p:childTnLst>
+                          </p:cTn>
+                        </p:par>
+                      </p:childTnLst>
+                    </p:cTn>
+                  </p:par>
+                  <p:par>
+                    <p:cTn id="9" fill="hold">
+                      <p:stCondLst>
+                        <p:cond delay="indefinite"/>
+                      </p:stCondLst>
+                      <p:childTnLst>
+                        <p:par>
+                          <p:cTn id="10" fill="hold">
+                            <p:stCondLst>
+                              <p:cond delay="0"/>
+                            </p:stCondLst>
+                            <p:childTnLst>
+                              <p:par>
+                                <p:cTn id="11" presetID="2" presetClass="entr" presetSubtype="4" fill="hold" grpId="0" nodeType="clickEffect">
+                                  <p:stCondLst>
+                                    <p:cond delay="0"/>
+                                  </p:stCondLst>
+                                  <p:childTnLst>
+                                    <p:set>
+                                      <p:cBhvr>
+                                        <p:cTn id="12" dur="1" fill="hold">
+                                          <p:stCondLst>
+                                            <p:cond delay="0"/>
+                                          </p:stCondLst>
+                                        </p:cTn>
+                                        <p:tgtEl>
+                                          <p:spTgt spid="3">
+                                            <p:txEl>
+                                              <p:pRg st="1" end="1"/>
+                                            </p:txEl>
+                                          </p:spTgt>
+                                        </p:tgtEl>
+                                        <p:attrNameLst>
+                                          <p:attrName>style.visibility</p:attrName>
+                                        </p:attrNameLst>
+                                      </p:cBhvr>
+                                      <p:to>
+                                        <p:strVal val="visible"/>
+                                      </p:to>
+                                    </p:set>
+                                    <p:anim calcmode="lin" valueType="num">
+                                      <p:cBhvr additive="base">
+                                        <p:cTn id="13" dur="500" fill="hold"/>
+                                        <p:tgtEl>
+                                          <p:spTgt spid="3">
+                                            <p:txEl>
+                                              <p:pRg st="1" end="1"/>
+                                            </p:txEl>
+                                          </p:spTgt>
+                                        </p:tgtEl>
+                                        <p:attrNameLst>
+                                          <p:attrName>ppt_x</p:attrName>
+                                        </p:attrNameLst>
+                                      </p:cBhvr>
+                                      <p:tavLst>
+                                        <p:tav tm="0">
+                                          <p:val>
+                                            <p:strVal val="#ppt_x"/>
+                                          </p:val>
+                                        </p:tav>
+                                        <p:tav tm="100000">
+                                          <p:val>
+                                            <p:strVal val="#ppt_x"/>
+                                          </p:val>
+                                        </p:tav>
+                                      </p:tavLst>
+                                    </p:anim>
+                                    <p:anim calcmode="lin" valueType="num">
+                                      <p:cBhvr additive="base">
+                                        <p:cTn id="14" dur="500" fill="hold"/>
+                                        <p:tgtEl>
+                                          <p:spTgt spid="3">
+                                            <p:txEl>
+                                              <p:pRg st="1" end="1"/>
+                                            </p:txEl>
+                                          </p:spTgt>
+                                        </p:tgtEl>
+                                        <p:attrNameLst>
+                                          <p:attrName>ppt_y</p:attrName>
+                                        </p:attrNameLst>
+                                      </p:cBhvr>
+                                      <p:tavLst>
+                                        <p:tav tm="0">
+                                          <p:val>
+                                            <p:strVal val="1+#ppt_h/2"/>
+                                          </p:val>
+                                        </p:tav>
+                                        <p:tav tm="100000">
+                                          <p:val>
+                                            <p:strVal val="#ppt_y"/>
+                                          </p:val>
+                                        </p:tav>
+                                      </p:tavLst>
+                                    </p:anim>
+                                  </p:childTnLst>
+                                </p:cTn>
+                              </p:par>
+                            </p:childTnLst>
+                          </p:cTn>
+                        </p:par>
+                      </p:childTnLst>
+                    </p:cTn>
+                  </p:par>
+                  <p:par>
+                    <p:cTn id="15" fill="hold">
+                      <p:stCondLst>
+                        <p:cond delay="indefinite"/>
+                      </p:stCondLst>
+                      <p:childTnLst>
+                        <p:par>
+                          <p:cTn id="16" fill="hold">
+                            <p:stCondLst>
+                              <p:cond delay="0"/>
+                            </p:stCondLst>
+                            <p:childTnLst>
+                              <p:par>
+                                <p:cTn id="17" presetID="2" presetClass="entr" presetSubtype="4" fill="hold" grpId="0" nodeType="clickEffect">
+                                  <p:stCondLst>
+                                    <p:cond delay="0"/>
+                                  </p:stCondLst>
+                                  <p:childTnLst>
+                                    <p:set>
+                                      <p:cBhvr>
+                                        <p:cTn id="18" dur="1" fill="hold">
+                                          <p:stCondLst>
+                                            <p:cond delay="0"/>
+                                          </p:stCondLst>
+                                        </p:cTn>
+                                        <p:tgtEl>
+                                          <p:spTgt spid="3">
+                                            <p:txEl>
+                                              <p:pRg st="2" end="2"/>
+                                            </p:txEl>
+                                          </p:spTgt>
+                                        </p:tgtEl>
+                                        <p:attrNameLst>
+                                          <p:attrName>style.visibility</p:attrName>
+                                        </p:attrNameLst>
+                                      </p:cBhvr>
+                                      <p:to>
+                                        <p:strVal val="visible"/>
+                                      </p:to>
+                                    </p:set>
+                                    <p:anim calcmode="lin" valueType="num">
+                                      <p:cBhvr additive="base">
+                                        <p:cTn id="19" dur="500" fill="hold"/>
+                                        <p:tgtEl>
+                                          <p:spTgt spid="3">
+                                            <p:txEl>
+                                              <p:pRg st="2" end="2"/>
+                                            </p:txEl>
+                                          </p:spTgt>
+                                        </p:tgtEl>
+                                        <p:attrNameLst>
+                                          <p:attrName>ppt_x</p:attrName>
+                                        </p:attrNameLst>
+                                      </p:cBhvr>
+                                      <p:tavLst>
+                                        <p:tav tm="0">
+                                          <p:val>
+                                            <p:strVal val="#ppt_x"/>
+                                          </p:val>
+                                        </p:tav>
+                                        <p:tav tm="100000">
+                                          <p:val>
+                                            <p:strVal val="#ppt_x"/>
+                                          </p:val>
+                                        </p:tav>
+                                      </p:tavLst>
+                                    </p:anim>
+                                    <p:anim calcmode="lin" valueType="num">
+                                      <p:cBhvr additive="base">
+                                        <p:cTn id="20" dur="500" fill="hold"/>
+                                        <p:tgtEl>
+                                          <p:spTgt spid="3">
+                                            <p:txEl>
+                                              <p:pRg st="2" end="2"/>
+                                            </p:txEl>
+                                          </p:spTgt>
+                                        </p:tgtEl>
+                                        <p:attrNameLst>
+                                          <p:attrName>ppt_y</p:attrName>
+                                        </p:attrNameLst>
+                                      </p:cBhvr>
+                                      <p:tavLst>
+                                        <p:tav tm="0">
+                                          <p:val>
+                                            <p:strVal val="1+#ppt_h/2"/>
+                                          </p:val>
+                                        </p:tav>
+                                        <p:tav tm="100000">
+                                          <p:val>
+                                            <p:strVal val="#ppt_y"/>
+                                          </p:val>
+                                        </p:tav>
+                                      </p:tavLst>
+                                    </p:anim>
+                                  </p:childTnLst>
+                                </p:cTn>
+                              </p:par>
+                            </p:childTnLst>
+                          </p:cTn>
+                        </p:par>
+                      </p:childTnLst>
+                    </p:cTn>
+                  </p:par>
+                  <p:par>
+                    <p:cTn id="21" fill="hold">
+                      <p:stCondLst>
+                        <p:cond delay="indefinite"/>
+                      </p:stCondLst>
+                      <p:childTnLst>
+                        <p:par>
+                          <p:cTn id="22" fill="hold">
+                            <p:stCondLst>
+                              <p:cond delay="0"/>
+                            </p:stCondLst>
+                            <p:childTnLst>
+                              <p:par>
+                                <p:cTn id="23" presetID="2" presetClass="entr" presetSubtype="4" fill="hold" grpId="0" nodeType="clickEffect">
+                                  <p:stCondLst>
+                                    <p:cond delay="0"/>
+                                  </p:stCondLst>
+                                  <p:childTnLst>
+                                    <p:set>
+                                      <p:cBhvr>
+                                        <p:cTn id="24" dur="1" fill="hold">
+                                          <p:stCondLst>
+                                            <p:cond delay="0"/>
+                                          </p:stCondLst>
+                                        </p:cTn>
+                                        <p:tgtEl>
+                                          <p:spTgt spid="3">
+                                            <p:txEl>
+                                              <p:pRg st="3" end="3"/>
+                                            </p:txEl>
+                                          </p:spTgt>
+                                        </p:tgtEl>
+                                        <p:attrNameLst>
+                                          <p:attrName>style.visibility</p:attrName>
+                                        </p:attrNameLst>
+                                      </p:cBhvr>
+                                      <p:to>
+                                        <p:strVal val="visible"/>
+                                      </p:to>
+                                    </p:set>
+                                    <p:anim calcmode="lin" valueType="num">
+                                      <p:cBhvr additive="base">
+                                        <p:cTn id="25" dur="500" fill="hold"/>
+                                        <p:tgtEl>
+                                          <p:spTgt spid="3">
+                                            <p:txEl>
+                                              <p:pRg st="3" end="3"/>
+                                            </p:txEl>
+                                          </p:spTgt>
+                                        </p:tgtEl>
+                                        <p:attrNameLst>
+                                          <p:attrName>ppt_x</p:attrName>
+                                        </p:attrNameLst>
+                                      </p:cBhvr>
+                                      <p:tavLst>
+                                        <p:tav tm="0">
+                                          <p:val>
+                                            <p:strVal val="#ppt_x"/>
+                                          </p:val>
+                                        </p:tav>
+                                        <p:tav tm="100000">
+                                          <p:val>
+                                            <p:strVal val="#ppt_x"/>
+                                          </p:val>
+                                        </p:tav>
+                                      </p:tavLst>
+                                    </p:anim>
+                                    <p:anim calcmode="lin" valueType="num">
+                                      <p:cBhvr additive="base">
+                                        <p:cTn id="26" dur="500" fill="hold"/>
+                                        <p:tgtEl>
+                                          <p:spTgt spid="3">
+                                            <p:txEl>
+                                              <p:pRg st="3" end="3"/>
+                                            </p:txEl>
+                                          </p:spTgt>
+                                        </p:tgtEl>
+                                        <p:attrNameLst>
+                                          <p:attrName>ppt_y</p:attrName>
+                                        </p:attrNameLst>
+                                      </p:cBhvr>
+                                      <p:tavLst>
+                                        <p:tav tm="0">
+                                          <p:val>
+                                            <p:strVal val="1+#ppt_h/2"/>
+                                          </p:val>
+                                        </p:tav>
+                                        <p:tav tm="100000">
+                                          <p:val>
+                                            <p:strVal val="#ppt_y"/>
+                                          </p:val>
+                                        </p:tav>
+                                      </p:tavLst>
+                                    </p:anim>
+                                  </p:childTnLst>
+                                </p:cTn>
+                              </p:par>
+                            </p:childTnLst>
+                          </p:cTn>
+                        </p:par>
+                      </p:childTnLst>
+                    </p:cTn>
+                  </p:par>
+                  <p:par>
+                    <p:cTn id="27" fill="hold">
+                      <p:stCondLst>
+                        <p:cond delay="indefinite"/>
+                      </p:stCondLst>
+                      <p:childTnLst>
+                        <p:par>
+                          <p:cTn id="28" fill="hold">
+                            <p:stCondLst>
+                              <p:cond delay="0"/>
+                            </p:stCondLst>
+                            <p:childTnLst>
+                              <p:par>
+                                <p:cTn id="29" presetID="2" presetClass="entr" presetSubtype="4" fill="hold" grpId="0" nodeType="clickEffect">
+                                  <p:stCondLst>
+                                    <p:cond delay="0"/>
+                                  </p:stCondLst>
+                                  <p:childTnLst>
+                                    <p:set>
+                                      <p:cBhvr>
+                                        <p:cTn id="30" dur="1" fill="hold">
+                                          <p:stCondLst>
+                                            <p:cond delay="0"/>
+                                          </p:stCondLst>
+                                        </p:cTn>
+                                        <p:tgtEl>
+                                          <p:spTgt spid="3">
+                                            <p:txEl>
+                                              <p:pRg st="4" end="4"/>
+                                            </p:txEl>
+                                          </p:spTgt>
+                                        </p:tgtEl>
+                                        <p:attrNameLst>
+                                          <p:attrName>style.visibility</p:attrName>
+                                        </p:attrNameLst>
+                                      </p:cBhvr>
+                                      <p:to>
+                                        <p:strVal val="visible"/>
+                                      </p:to>
+                                    </p:set>
+                                    <p:anim calcmode="lin" valueType="num">
+                                      <p:cBhvr additive="base">
+                                        <p:cTn id="31" dur="500" fill="hold"/>
+                                        <p:tgtEl>
+                                          <p:spTgt spid="3">
+                                            <p:txEl>
+                                              <p:pRg st="4" end="4"/>
+                                            </p:txEl>
+                                          </p:spTgt>
+                                        </p:tgtEl>
+                                        <p:attrNameLst>
+                                          <p:attrName>ppt_x</p:attrName>
+                                        </p:attrNameLst>
+                                      </p:cBhvr>
+                                      <p:tavLst>
+                                        <p:tav tm="0">
+                                          <p:val>
+                                            <p:strVal val="#ppt_x"/>
+                                          </p:val>
+                                        </p:tav>
+                                        <p:tav tm="100000">
+                                          <p:val>
+                                            <p:strVal val="#ppt_x"/>
+                                          </p:val>
+                                        </p:tav>
+                                      </p:tavLst>
+                                    </p:anim>
+                                    <p:anim calcmode="lin" valueType="num">
+                                      <p:cBhvr additive="base">
+                                        <p:cTn id="32" dur="500" fill="hold"/>
+                                        <p:tgtEl>
+                                          <p:spTgt spid="3">
+                                            <p:txEl>
+                                              <p:pRg st="4" end="4"/>
+                                            </p:txEl>
+                                          </p:spTgt>
+                                        </p:tgtEl>
+                                        <p:attrNameLst>
+                                          <p:attrName>ppt_y</p:attrName>
+                                        </p:attrNameLst>
+                                      </p:cBhvr>
+                                      <p:tavLst>
+                                        <p:tav tm="0">
+                                          <p:val>
+                                            <p:strVal val="1+#ppt_h/2"/>
+                                          </p:val>
+                                        </p:tav>
+                                        <p:tav tm="100000">
+                                          <p:val>
+                                            <p:strVal val="#ppt_y"/>
+                                          </p:val>
+                                        </p:tav>
+                                      </p:tavLst>
+                                    </p:anim>
+                                  </p:childTnLst>
+                                </p:cTn>
+                              </p:par>
+                            </p:childTnLst>
+                          </p:cTn>
+                        </p:par>
+                      </p:childTnLst>
+                    </p:cTn>
+                  </p:par>
+                </p:childTnLst>
+              </p:cTn>
+              <p:prevCondLst>
+                <p:cond evt="onPrev" delay="0">
+                  <p:tgtEl>
+                    <p:sldTgt/>
+                  </p:tgtEl>
+                </p:cond>
+              </p:prevCondLst>
+              <p:nextCondLst>
+                <p:cond evt="onNext" delay="0">
+                  <p:tgtEl>
+                    <p:sldTgt/>
+                  </p:tgtEl>
+                </p:cond>
+              </p:nextCondLst>
+            </p:seq>
+          </p:childTnLst>
+        </p:cTn>
+      </p:par>
+    </p:tnLst>
+    <p:bldLst>
+      <p:bldP spid="2" grpId="0"/>
+      <p:bldP spid="3" grpId="0" build="p"/>
+    </p:bldLst>
+  </p:timing>
+</p:sld>
+</file>
+
+<file path=ppt/slides/slide4.xml><?xml version="1.0" encoding="utf-8"?>
 <p:sld xmlns:a="http://schemas.openxmlformats.org/drawingml/2006/main" xmlns:r="http://schemas.openxmlformats.org/officeDocument/2006/relationships" xmlns:p="http://schemas.openxmlformats.org/presentationml/2006/main">
   <p:cSld>
     <p:spTree>
@@ -14219,7 +15250,7 @@
 </p:sld>
 </file>
 
-<file path=ppt/slides/slide4.xml><?xml version="1.0" encoding="utf-8"?>
+<file path=ppt/slides/slide5.xml><?xml version="1.0" encoding="utf-8"?>
 <p:sld xmlns:a="http://schemas.openxmlformats.org/drawingml/2006/main" xmlns:r="http://schemas.openxmlformats.org/officeDocument/2006/relationships" xmlns:p="http://schemas.openxmlformats.org/presentationml/2006/main">
   <p:cSld>
     <p:spTree>
@@ -14434,6 +15465,97 @@
                       </p:childTnLst>
                     </p:cTn>
                   </p:par>
+                  <p:par>
+                    <p:cTn id="7" fill="hold">
+                      <p:stCondLst>
+                        <p:cond delay="indefinite"/>
+                      </p:stCondLst>
+                      <p:childTnLst>
+                        <p:par>
+                          <p:cTn id="8" fill="hold">
+                            <p:stCondLst>
+                              <p:cond delay="0"/>
+                            </p:stCondLst>
+                            <p:childTnLst>
+                              <p:par>
+                                <p:cTn id="9" presetID="2" presetClass="entr" presetSubtype="4" fill="hold" grpId="0" nodeType="clickEffect">
+                                  <p:stCondLst>
+                                    <p:cond delay="0"/>
+                                  </p:stCondLst>
+                                  <p:childTnLst>
+                                    <p:set>
+                                      <p:cBhvr>
+                                        <p:cTn id="10" dur="1" fill="hold">
+                                          <p:stCondLst>
+                                            <p:cond delay="0"/>
+                                          </p:stCondLst>
+                                        </p:cTn>
+                                        <p:tgtEl>
+                                          <p:spTgt spid="5"/>
+                                        </p:tgtEl>
+                                        <p:attrNameLst>
+                                          <p:attrName>style.visibility</p:attrName>
+                                        </p:attrNameLst>
+                                      </p:cBhvr>
+                                      <p:to>
+                                        <p:strVal val="visible"/>
+                                      </p:to>
+                                    </p:set>
+                                    <p:anim calcmode="lin" valueType="num">
+                                      <p:cBhvr additive="base">
+                                        <p:cTn id="11" dur="500" fill="hold"/>
+                                        <p:tgtEl>
+                                          <p:spTgt spid="5"/>
+                                        </p:tgtEl>
+                                        <p:attrNameLst>
+                                          <p:attrName>ppt_x</p:attrName>
+                                        </p:attrNameLst>
+                                      </p:cBhvr>
+                                      <p:tavLst>
+                                        <p:tav tm="0">
+                                          <p:val>
+                                            <p:strVal val="#ppt_x"/>
+                                          </p:val>
+                                        </p:tav>
+                                        <p:tav tm="100000">
+                                          <p:val>
+                                            <p:strVal val="#ppt_x"/>
+                                          </p:val>
+                                        </p:tav>
+                                      </p:tavLst>
+                                    </p:anim>
+                                    <p:anim calcmode="lin" valueType="num">
+                                      <p:cBhvr additive="base">
+                                        <p:cTn id="12" dur="500" fill="hold"/>
+                                        <p:tgtEl>
+                                          <p:spTgt spid="5"/>
+                                        </p:tgtEl>
+                                        <p:attrNameLst>
+                                          <p:attrName>ppt_y</p:attrName>
+                                        </p:attrNameLst>
+                                      </p:cBhvr>
+                                      <p:tavLst>
+                                        <p:tav tm="0">
+                                          <p:val>
+                                            <p:strVal val="1+#ppt_h/2"/>
+                                          </p:val>
+                                        </p:tav>
+                                        <p:tav tm="100000">
+                                          <p:val>
+                                            <p:strVal val="#ppt_y"/>
+                                          </p:val>
+                                        </p:tav>
+                                      </p:tavLst>
+                                    </p:anim>
+                                  </p:childTnLst>
+                                </p:cTn>
+                              </p:par>
+                            </p:childTnLst>
+                          </p:cTn>
+                        </p:par>
+                      </p:childTnLst>
+                    </p:cTn>
+                  </p:par>
                 </p:childTnLst>
               </p:cTn>
               <p:prevCondLst>
@@ -14457,12 +15579,15 @@
     </p:tnLst>
     <p:bldLst>
       <p:bldP spid="2" grpId="0"/>
+      <p:bldGraphic spid="5" grpId="0">
+        <p:bldAsOne/>
+      </p:bldGraphic>
     </p:bldLst>
   </p:timing>
 </p:sld>
 </file>
 
-<file path=ppt/slides/slide5.xml><?xml version="1.0" encoding="utf-8"?>
+<file path=ppt/slides/slide6.xml><?xml version="1.0" encoding="utf-8"?>
 <p:sld xmlns:a="http://schemas.openxmlformats.org/drawingml/2006/main" xmlns:r="http://schemas.openxmlformats.org/officeDocument/2006/relationships" xmlns:p="http://schemas.openxmlformats.org/presentationml/2006/main">
   <p:cSld>
     <p:bg>
@@ -14807,698 +15932,6 @@
 </p:sld>
 </file>
 
-<file path=ppt/slides/slide6.xml><?xml version="1.0" encoding="utf-8"?>
-<p:sld xmlns:a="http://schemas.openxmlformats.org/drawingml/2006/main" xmlns:r="http://schemas.openxmlformats.org/officeDocument/2006/relationships" xmlns:p="http://schemas.openxmlformats.org/presentationml/2006/main">
-  <p:cSld>
-    <p:bg>
-      <p:bgPr>
-        <a:solidFill>
-          <a:schemeClr val="bg1"/>
-        </a:solidFill>
-        <a:effectLst/>
-      </p:bgPr>
-    </p:bg>
-    <p:spTree>
-      <p:nvGrpSpPr>
-        <p:cNvPr id="1" name=""/>
-        <p:cNvGrpSpPr/>
-        <p:nvPr/>
-      </p:nvGrpSpPr>
-      <p:grpSpPr>
-        <a:xfrm>
-          <a:off x="0" y="0"/>
-          <a:ext cx="0" cy="0"/>
-          <a:chOff x="0" y="0"/>
-          <a:chExt cx="0" cy="0"/>
-        </a:xfrm>
-      </p:grpSpPr>
-      <p:sp>
-        <p:nvSpPr>
-          <p:cNvPr id="2" name="Title 1">
-            <a:extLst>
-              <a:ext uri="{FF2B5EF4-FFF2-40B4-BE49-F238E27FC236}">
-                <a16:creationId xmlns:a16="http://schemas.microsoft.com/office/drawing/2014/main" id="{E31D61D9-9039-133C-C496-C82302AA706C}"/>
-              </a:ext>
-            </a:extLst>
-          </p:cNvPr>
-          <p:cNvSpPr>
-            <a:spLocks noGrp="1"/>
-          </p:cNvSpPr>
-          <p:nvPr>
-            <p:ph type="title"/>
-          </p:nvPr>
-        </p:nvSpPr>
-        <p:spPr>
-          <a:xfrm>
-            <a:off x="789965" y="725467"/>
-            <a:ext cx="4952999" cy="1580411"/>
-          </a:xfrm>
-        </p:spPr>
-        <p:txBody>
-          <a:bodyPr>
-            <a:normAutofit/>
-          </a:bodyPr>
-          <a:lstStyle/>
-          <a:p>
-            <a:r>
-              <a:rPr lang="en-AU" dirty="0"/>
-              <a:t>Introduction</a:t>
-            </a:r>
-          </a:p>
-        </p:txBody>
-      </p:sp>
-      <p:sp>
-        <p:nvSpPr>
-          <p:cNvPr id="3" name="Content Placeholder 2">
-            <a:extLst>
-              <a:ext uri="{FF2B5EF4-FFF2-40B4-BE49-F238E27FC236}">
-                <a16:creationId xmlns:a16="http://schemas.microsoft.com/office/drawing/2014/main" id="{BB59DD5E-5F10-A0B7-AE54-62FF24BCDA43}"/>
-              </a:ext>
-            </a:extLst>
-          </p:cNvPr>
-          <p:cNvSpPr>
-            <a:spLocks noGrp="1"/>
-          </p:cNvSpPr>
-          <p:nvPr>
-            <p:ph idx="1"/>
-          </p:nvPr>
-        </p:nvSpPr>
-        <p:spPr>
-          <a:xfrm>
-            <a:off x="457200" y="2001078"/>
-            <a:ext cx="4952999" cy="4131455"/>
-          </a:xfrm>
-        </p:spPr>
-        <p:txBody>
-          <a:bodyPr>
-            <a:normAutofit/>
-          </a:bodyPr>
-          <a:lstStyle/>
-          <a:p>
-            <a:pPr marL="0" indent="0">
-              <a:lnSpc>
-                <a:spcPct val="100000"/>
-              </a:lnSpc>
-              <a:buNone/>
-            </a:pPr>
-            <a:endParaRPr lang="en-US" sz="1000" b="1" i="0" dirty="0">
-              <a:effectLst/>
-              <a:latin typeface="sohne"/>
-            </a:endParaRPr>
-          </a:p>
-          <a:p>
-            <a:pPr>
-              <a:lnSpc>
-                <a:spcPct val="100000"/>
-              </a:lnSpc>
-            </a:pPr>
-            <a:r>
-              <a:rPr lang="en-US" sz="1400" b="0" i="0" dirty="0">
-                <a:effectLst/>
-                <a:latin typeface="source-serif-pro"/>
-              </a:rPr>
-              <a:t>The two critical questions in the lending industry are</a:t>
-            </a:r>
-            <a:r>
-              <a:rPr lang="en-US" sz="1400" dirty="0">
-                <a:latin typeface="source-serif-pro"/>
-              </a:rPr>
-              <a:t>,  </a:t>
-            </a:r>
-            <a:r>
-              <a:rPr lang="en-US" sz="1400" b="0" i="0" dirty="0">
-                <a:effectLst/>
-                <a:latin typeface="source-serif-pro"/>
-              </a:rPr>
-              <a:t>A) What sort of is the borrower? B) </a:t>
-            </a:r>
-            <a:r>
-              <a:rPr lang="en-US" sz="1400" dirty="0">
-                <a:latin typeface="source-serif-pro"/>
-              </a:rPr>
-              <a:t>Considering </a:t>
-            </a:r>
-            <a:r>
-              <a:rPr lang="en-US" sz="1400" b="0" i="0" dirty="0">
-                <a:effectLst/>
-                <a:latin typeface="source-serif-pro"/>
-              </a:rPr>
-              <a:t>the borrower’s risk, Could we lend </a:t>
-            </a:r>
-            <a:r>
-              <a:rPr lang="en-US" sz="1400" dirty="0">
-                <a:latin typeface="source-serif-pro"/>
-              </a:rPr>
-              <a:t>to the borrower</a:t>
-            </a:r>
-            <a:r>
-              <a:rPr lang="en-US" sz="1400" b="0" i="0" dirty="0">
-                <a:effectLst/>
-                <a:latin typeface="source-serif-pro"/>
-              </a:rPr>
-              <a:t>?</a:t>
-            </a:r>
-          </a:p>
-          <a:p>
-            <a:pPr>
-              <a:lnSpc>
-                <a:spcPct val="100000"/>
-              </a:lnSpc>
-            </a:pPr>
-            <a:r>
-              <a:rPr lang="en-US" sz="1400" b="0" i="0" dirty="0">
-                <a:effectLst/>
-                <a:latin typeface="source-serif-pro"/>
-              </a:rPr>
-              <a:t> Lenders provide loans to borrowers in exchange for the promise of repayment with interest. That means the lender only makes profit if the borrower pays off the loan. However, if </a:t>
-            </a:r>
-            <a:r>
-              <a:rPr lang="en-US" sz="1400" dirty="0">
-                <a:latin typeface="source-serif-pro"/>
-              </a:rPr>
-              <a:t>borrower </a:t>
-            </a:r>
-            <a:r>
-              <a:rPr lang="en-US" sz="1400" b="0" i="0" dirty="0">
-                <a:effectLst/>
-                <a:latin typeface="source-serif-pro"/>
-              </a:rPr>
-              <a:t>doesn’t repay the loan, then the lender loses money. </a:t>
-            </a:r>
-          </a:p>
-          <a:p>
-            <a:pPr>
-              <a:lnSpc>
-                <a:spcPct val="100000"/>
-              </a:lnSpc>
-            </a:pPr>
-            <a:r>
-              <a:rPr lang="en-US" sz="1400" b="0" i="0" dirty="0">
-                <a:effectLst/>
-                <a:latin typeface="source-serif-pro"/>
-              </a:rPr>
-              <a:t>So for this project We’ll be using publicly available data from </a:t>
-            </a:r>
-            <a:r>
-              <a:rPr lang="en-US" sz="1400" u="sng" dirty="0">
-                <a:latin typeface="source-serif-pro"/>
-              </a:rPr>
-              <a:t>https://www.kaggle.com </a:t>
-            </a:r>
-            <a:r>
-              <a:rPr lang="en-US" sz="1400" b="0" i="0" dirty="0">
-                <a:effectLst/>
-                <a:latin typeface="source-serif-pro"/>
-              </a:rPr>
-              <a:t> . The data covers the 9,578 loans funded by the platform between 2007 and 2010. Considering all we’ll predict if the borrower will repay the loan by its mature date or not. </a:t>
-            </a:r>
-          </a:p>
-          <a:p>
-            <a:pPr>
-              <a:lnSpc>
-                <a:spcPct val="100000"/>
-              </a:lnSpc>
-            </a:pPr>
-            <a:endParaRPr lang="en-AU" sz="1000" dirty="0"/>
-          </a:p>
-        </p:txBody>
-      </p:sp>
-      <p:pic>
-        <p:nvPicPr>
-          <p:cNvPr id="53" name="Picture 4" descr="Graph">
-            <a:extLst>
-              <a:ext uri="{FF2B5EF4-FFF2-40B4-BE49-F238E27FC236}">
-                <a16:creationId xmlns:a16="http://schemas.microsoft.com/office/drawing/2014/main" id="{23387D32-7E6B-7229-2C18-5347681455FA}"/>
-              </a:ext>
-            </a:extLst>
-          </p:cNvPr>
-          <p:cNvPicPr>
-            <a:picLocks noChangeAspect="1"/>
-          </p:cNvPicPr>
-          <p:nvPr/>
-        </p:nvPicPr>
-        <p:blipFill rotWithShape="1">
-          <a:blip r:embed="rId2"/>
-          <a:srcRect l="14518" r="29652" b="1"/>
-          <a:stretch/>
-        </p:blipFill>
-        <p:spPr>
-          <a:xfrm>
-            <a:off x="6075730" y="-3440"/>
-            <a:ext cx="6129239" cy="6861439"/>
-          </a:xfrm>
-          <a:prstGeom prst="rect">
-            <a:avLst/>
-          </a:prstGeom>
-        </p:spPr>
-      </p:pic>
-    </p:spTree>
-    <p:extLst>
-      <p:ext uri="{BB962C8B-B14F-4D97-AF65-F5344CB8AC3E}">
-        <p14:creationId xmlns:p14="http://schemas.microsoft.com/office/powerpoint/2010/main" val="1323158687"/>
-      </p:ext>
-    </p:extLst>
-  </p:cSld>
-  <p:clrMapOvr>
-    <a:masterClrMapping/>
-  </p:clrMapOvr>
-  <p:timing>
-    <p:tnLst>
-      <p:par>
-        <p:cTn id="1" dur="indefinite" restart="never" nodeType="tmRoot">
-          <p:childTnLst>
-            <p:seq concurrent="1" nextAc="seek">
-              <p:cTn id="2" dur="indefinite" nodeType="mainSeq">
-                <p:childTnLst>
-                  <p:par>
-                    <p:cTn id="3" fill="hold">
-                      <p:stCondLst>
-                        <p:cond delay="indefinite"/>
-                      </p:stCondLst>
-                      <p:childTnLst>
-                        <p:par>
-                          <p:cTn id="4" fill="hold">
-                            <p:stCondLst>
-                              <p:cond delay="0"/>
-                            </p:stCondLst>
-                            <p:childTnLst>
-                              <p:par>
-                                <p:cTn id="5" presetID="2" presetClass="entr" presetSubtype="4" fill="hold" grpId="0" nodeType="clickEffect">
-                                  <p:stCondLst>
-                                    <p:cond delay="0"/>
-                                  </p:stCondLst>
-                                  <p:childTnLst>
-                                    <p:set>
-                                      <p:cBhvr>
-                                        <p:cTn id="6" dur="1" fill="hold">
-                                          <p:stCondLst>
-                                            <p:cond delay="0"/>
-                                          </p:stCondLst>
-                                        </p:cTn>
-                                        <p:tgtEl>
-                                          <p:spTgt spid="2"/>
-                                        </p:tgtEl>
-                                        <p:attrNameLst>
-                                          <p:attrName>style.visibility</p:attrName>
-                                        </p:attrNameLst>
-                                      </p:cBhvr>
-                                      <p:to>
-                                        <p:strVal val="visible"/>
-                                      </p:to>
-                                    </p:set>
-                                    <p:anim calcmode="lin" valueType="num">
-                                      <p:cBhvr additive="base">
-                                        <p:cTn id="7" dur="500" fill="hold"/>
-                                        <p:tgtEl>
-                                          <p:spTgt spid="2"/>
-                                        </p:tgtEl>
-                                        <p:attrNameLst>
-                                          <p:attrName>ppt_x</p:attrName>
-                                        </p:attrNameLst>
-                                      </p:cBhvr>
-                                      <p:tavLst>
-                                        <p:tav tm="0">
-                                          <p:val>
-                                            <p:strVal val="#ppt_x"/>
-                                          </p:val>
-                                        </p:tav>
-                                        <p:tav tm="100000">
-                                          <p:val>
-                                            <p:strVal val="#ppt_x"/>
-                                          </p:val>
-                                        </p:tav>
-                                      </p:tavLst>
-                                    </p:anim>
-                                    <p:anim calcmode="lin" valueType="num">
-                                      <p:cBhvr additive="base">
-                                        <p:cTn id="8" dur="500" fill="hold"/>
-                                        <p:tgtEl>
-                                          <p:spTgt spid="2"/>
-                                        </p:tgtEl>
-                                        <p:attrNameLst>
-                                          <p:attrName>ppt_y</p:attrName>
-                                        </p:attrNameLst>
-                                      </p:cBhvr>
-                                      <p:tavLst>
-                                        <p:tav tm="0">
-                                          <p:val>
-                                            <p:strVal val="1+#ppt_h/2"/>
-                                          </p:val>
-                                        </p:tav>
-                                        <p:tav tm="100000">
-                                          <p:val>
-                                            <p:strVal val="#ppt_y"/>
-                                          </p:val>
-                                        </p:tav>
-                                      </p:tavLst>
-                                    </p:anim>
-                                  </p:childTnLst>
-                                </p:cTn>
-                              </p:par>
-                            </p:childTnLst>
-                          </p:cTn>
-                        </p:par>
-                      </p:childTnLst>
-                    </p:cTn>
-                  </p:par>
-                  <p:par>
-                    <p:cTn id="9" fill="hold">
-                      <p:stCondLst>
-                        <p:cond delay="indefinite"/>
-                      </p:stCondLst>
-                      <p:childTnLst>
-                        <p:par>
-                          <p:cTn id="10" fill="hold">
-                            <p:stCondLst>
-                              <p:cond delay="0"/>
-                            </p:stCondLst>
-                            <p:childTnLst>
-                              <p:par>
-                                <p:cTn id="11" presetID="2" presetClass="entr" presetSubtype="4" fill="hold" grpId="0" nodeType="clickEffect">
-                                  <p:stCondLst>
-                                    <p:cond delay="0"/>
-                                  </p:stCondLst>
-                                  <p:childTnLst>
-                                    <p:set>
-                                      <p:cBhvr>
-                                        <p:cTn id="12" dur="1" fill="hold">
-                                          <p:stCondLst>
-                                            <p:cond delay="0"/>
-                                          </p:stCondLst>
-                                        </p:cTn>
-                                        <p:tgtEl>
-                                          <p:spTgt spid="3">
-                                            <p:txEl>
-                                              <p:pRg st="1" end="1"/>
-                                            </p:txEl>
-                                          </p:spTgt>
-                                        </p:tgtEl>
-                                        <p:attrNameLst>
-                                          <p:attrName>style.visibility</p:attrName>
-                                        </p:attrNameLst>
-                                      </p:cBhvr>
-                                      <p:to>
-                                        <p:strVal val="visible"/>
-                                      </p:to>
-                                    </p:set>
-                                    <p:anim calcmode="lin" valueType="num">
-                                      <p:cBhvr additive="base">
-                                        <p:cTn id="13" dur="500" fill="hold"/>
-                                        <p:tgtEl>
-                                          <p:spTgt spid="3">
-                                            <p:txEl>
-                                              <p:pRg st="1" end="1"/>
-                                            </p:txEl>
-                                          </p:spTgt>
-                                        </p:tgtEl>
-                                        <p:attrNameLst>
-                                          <p:attrName>ppt_x</p:attrName>
-                                        </p:attrNameLst>
-                                      </p:cBhvr>
-                                      <p:tavLst>
-                                        <p:tav tm="0">
-                                          <p:val>
-                                            <p:strVal val="#ppt_x"/>
-                                          </p:val>
-                                        </p:tav>
-                                        <p:tav tm="100000">
-                                          <p:val>
-                                            <p:strVal val="#ppt_x"/>
-                                          </p:val>
-                                        </p:tav>
-                                      </p:tavLst>
-                                    </p:anim>
-                                    <p:anim calcmode="lin" valueType="num">
-                                      <p:cBhvr additive="base">
-                                        <p:cTn id="14" dur="500" fill="hold"/>
-                                        <p:tgtEl>
-                                          <p:spTgt spid="3">
-                                            <p:txEl>
-                                              <p:pRg st="1" end="1"/>
-                                            </p:txEl>
-                                          </p:spTgt>
-                                        </p:tgtEl>
-                                        <p:attrNameLst>
-                                          <p:attrName>ppt_y</p:attrName>
-                                        </p:attrNameLst>
-                                      </p:cBhvr>
-                                      <p:tavLst>
-                                        <p:tav tm="0">
-                                          <p:val>
-                                            <p:strVal val="1+#ppt_h/2"/>
-                                          </p:val>
-                                        </p:tav>
-                                        <p:tav tm="100000">
-                                          <p:val>
-                                            <p:strVal val="#ppt_y"/>
-                                          </p:val>
-                                        </p:tav>
-                                      </p:tavLst>
-                                    </p:anim>
-                                  </p:childTnLst>
-                                </p:cTn>
-                              </p:par>
-                            </p:childTnLst>
-                          </p:cTn>
-                        </p:par>
-                      </p:childTnLst>
-                    </p:cTn>
-                  </p:par>
-                  <p:par>
-                    <p:cTn id="15" fill="hold">
-                      <p:stCondLst>
-                        <p:cond delay="indefinite"/>
-                      </p:stCondLst>
-                      <p:childTnLst>
-                        <p:par>
-                          <p:cTn id="16" fill="hold">
-                            <p:stCondLst>
-                              <p:cond delay="0"/>
-                            </p:stCondLst>
-                            <p:childTnLst>
-                              <p:par>
-                                <p:cTn id="17" presetID="2" presetClass="entr" presetSubtype="4" fill="hold" grpId="0" nodeType="clickEffect">
-                                  <p:stCondLst>
-                                    <p:cond delay="0"/>
-                                  </p:stCondLst>
-                                  <p:childTnLst>
-                                    <p:set>
-                                      <p:cBhvr>
-                                        <p:cTn id="18" dur="1" fill="hold">
-                                          <p:stCondLst>
-                                            <p:cond delay="0"/>
-                                          </p:stCondLst>
-                                        </p:cTn>
-                                        <p:tgtEl>
-                                          <p:spTgt spid="3">
-                                            <p:txEl>
-                                              <p:pRg st="2" end="2"/>
-                                            </p:txEl>
-                                          </p:spTgt>
-                                        </p:tgtEl>
-                                        <p:attrNameLst>
-                                          <p:attrName>style.visibility</p:attrName>
-                                        </p:attrNameLst>
-                                      </p:cBhvr>
-                                      <p:to>
-                                        <p:strVal val="visible"/>
-                                      </p:to>
-                                    </p:set>
-                                    <p:anim calcmode="lin" valueType="num">
-                                      <p:cBhvr additive="base">
-                                        <p:cTn id="19" dur="500" fill="hold"/>
-                                        <p:tgtEl>
-                                          <p:spTgt spid="3">
-                                            <p:txEl>
-                                              <p:pRg st="2" end="2"/>
-                                            </p:txEl>
-                                          </p:spTgt>
-                                        </p:tgtEl>
-                                        <p:attrNameLst>
-                                          <p:attrName>ppt_x</p:attrName>
-                                        </p:attrNameLst>
-                                      </p:cBhvr>
-                                      <p:tavLst>
-                                        <p:tav tm="0">
-                                          <p:val>
-                                            <p:strVal val="#ppt_x"/>
-                                          </p:val>
-                                        </p:tav>
-                                        <p:tav tm="100000">
-                                          <p:val>
-                                            <p:strVal val="#ppt_x"/>
-                                          </p:val>
-                                        </p:tav>
-                                      </p:tavLst>
-                                    </p:anim>
-                                    <p:anim calcmode="lin" valueType="num">
-                                      <p:cBhvr additive="base">
-                                        <p:cTn id="20" dur="500" fill="hold"/>
-                                        <p:tgtEl>
-                                          <p:spTgt spid="3">
-                                            <p:txEl>
-                                              <p:pRg st="2" end="2"/>
-                                            </p:txEl>
-                                          </p:spTgt>
-                                        </p:tgtEl>
-                                        <p:attrNameLst>
-                                          <p:attrName>ppt_y</p:attrName>
-                                        </p:attrNameLst>
-                                      </p:cBhvr>
-                                      <p:tavLst>
-                                        <p:tav tm="0">
-                                          <p:val>
-                                            <p:strVal val="1+#ppt_h/2"/>
-                                          </p:val>
-                                        </p:tav>
-                                        <p:tav tm="100000">
-                                          <p:val>
-                                            <p:strVal val="#ppt_y"/>
-                                          </p:val>
-                                        </p:tav>
-                                      </p:tavLst>
-                                    </p:anim>
-                                  </p:childTnLst>
-                                </p:cTn>
-                              </p:par>
-                            </p:childTnLst>
-                          </p:cTn>
-                        </p:par>
-                      </p:childTnLst>
-                    </p:cTn>
-                  </p:par>
-                  <p:par>
-                    <p:cTn id="21" fill="hold">
-                      <p:stCondLst>
-                        <p:cond delay="indefinite"/>
-                      </p:stCondLst>
-                      <p:childTnLst>
-                        <p:par>
-                          <p:cTn id="22" fill="hold">
-                            <p:stCondLst>
-                              <p:cond delay="0"/>
-                            </p:stCondLst>
-                            <p:childTnLst>
-                              <p:par>
-                                <p:cTn id="23" presetID="2" presetClass="entr" presetSubtype="4" fill="hold" grpId="0" nodeType="clickEffect">
-                                  <p:stCondLst>
-                                    <p:cond delay="0"/>
-                                  </p:stCondLst>
-                                  <p:childTnLst>
-                                    <p:set>
-                                      <p:cBhvr>
-                                        <p:cTn id="24" dur="1" fill="hold">
-                                          <p:stCondLst>
-                                            <p:cond delay="0"/>
-                                          </p:stCondLst>
-                                        </p:cTn>
-                                        <p:tgtEl>
-                                          <p:spTgt spid="3">
-                                            <p:txEl>
-                                              <p:pRg st="3" end="3"/>
-                                            </p:txEl>
-                                          </p:spTgt>
-                                        </p:tgtEl>
-                                        <p:attrNameLst>
-                                          <p:attrName>style.visibility</p:attrName>
-                                        </p:attrNameLst>
-                                      </p:cBhvr>
-                                      <p:to>
-                                        <p:strVal val="visible"/>
-                                      </p:to>
-                                    </p:set>
-                                    <p:anim calcmode="lin" valueType="num">
-                                      <p:cBhvr additive="base">
-                                        <p:cTn id="25" dur="500" fill="hold"/>
-                                        <p:tgtEl>
-                                          <p:spTgt spid="3">
-                                            <p:txEl>
-                                              <p:pRg st="3" end="3"/>
-                                            </p:txEl>
-                                          </p:spTgt>
-                                        </p:tgtEl>
-                                        <p:attrNameLst>
-                                          <p:attrName>ppt_x</p:attrName>
-                                        </p:attrNameLst>
-                                      </p:cBhvr>
-                                      <p:tavLst>
-                                        <p:tav tm="0">
-                                          <p:val>
-                                            <p:strVal val="#ppt_x"/>
-                                          </p:val>
-                                        </p:tav>
-                                        <p:tav tm="100000">
-                                          <p:val>
-                                            <p:strVal val="#ppt_x"/>
-                                          </p:val>
-                                        </p:tav>
-                                      </p:tavLst>
-                                    </p:anim>
-                                    <p:anim calcmode="lin" valueType="num">
-                                      <p:cBhvr additive="base">
-                                        <p:cTn id="26" dur="500" fill="hold"/>
-                                        <p:tgtEl>
-                                          <p:spTgt spid="3">
-                                            <p:txEl>
-                                              <p:pRg st="3" end="3"/>
-                                            </p:txEl>
-                                          </p:spTgt>
-                                        </p:tgtEl>
-                                        <p:attrNameLst>
-                                          <p:attrName>ppt_y</p:attrName>
-                                        </p:attrNameLst>
-                                      </p:cBhvr>
-                                      <p:tavLst>
-                                        <p:tav tm="0">
-                                          <p:val>
-                                            <p:strVal val="1+#ppt_h/2"/>
-                                          </p:val>
-                                        </p:tav>
-                                        <p:tav tm="100000">
-                                          <p:val>
-                                            <p:strVal val="#ppt_y"/>
-                                          </p:val>
-                                        </p:tav>
-                                      </p:tavLst>
-                                    </p:anim>
-                                  </p:childTnLst>
-                                </p:cTn>
-                              </p:par>
-                            </p:childTnLst>
-                          </p:cTn>
-                        </p:par>
-                      </p:childTnLst>
-                    </p:cTn>
-                  </p:par>
-                </p:childTnLst>
-              </p:cTn>
-              <p:prevCondLst>
-                <p:cond evt="onPrev" delay="0">
-                  <p:tgtEl>
-                    <p:sldTgt/>
-                  </p:tgtEl>
-                </p:cond>
-              </p:prevCondLst>
-              <p:nextCondLst>
-                <p:cond evt="onNext" delay="0">
-                  <p:tgtEl>
-                    <p:sldTgt/>
-                  </p:tgtEl>
-                </p:cond>
-              </p:nextCondLst>
-            </p:seq>
-          </p:childTnLst>
-        </p:cTn>
-      </p:par>
-    </p:tnLst>
-    <p:bldLst>
-      <p:bldP spid="2" grpId="0"/>
-      <p:bldP spid="3" grpId="0" build="p"/>
-    </p:bldLst>
-  </p:timing>
-</p:sld>
-</file>
-
 <file path=ppt/slides/slide7.xml><?xml version="1.0" encoding="utf-8"?>
 <p:sld xmlns:a="http://schemas.openxmlformats.org/drawingml/2006/main" xmlns:r="http://schemas.openxmlformats.org/officeDocument/2006/relationships" xmlns:p="http://schemas.openxmlformats.org/presentationml/2006/main">
   <p:cSld>
@@ -15648,69 +16081,20 @@
                 <a:effectLst/>
                 <a:latin typeface="source-serif-pro"/>
               </a:rPr>
-              <a:t>: The purpose of the loan such as: </a:t>
-            </a:r>
-            <a:r>
-              <a:rPr lang="en-US" b="0" i="0" dirty="0" err="1">
-                <a:effectLst/>
+              <a:t>: The purpose of the loan such as: credit card, Educational, debt consolidation</a:t>
+            </a:r>
+            <a:r>
+              <a:rPr lang="en-US" dirty="0">
                 <a:latin typeface="source-serif-pro"/>
               </a:rPr>
-              <a:t>credit_card</a:t>
+              <a:t>.</a:t>
             </a:r>
             <a:r>
               <a:rPr lang="en-US" b="0" i="0" dirty="0">
                 <a:effectLst/>
                 <a:latin typeface="source-serif-pro"/>
               </a:rPr>
-              <a:t>, </a:t>
-            </a:r>
-            <a:r>
-              <a:rPr lang="en-US" b="0" i="0" dirty="0" err="1">
-                <a:effectLst/>
-                <a:latin typeface="source-serif-pro"/>
-              </a:rPr>
-              <a:t>Educationl</a:t>
-            </a:r>
-            <a:r>
-              <a:rPr lang="en-US" b="0" i="0" dirty="0">
-                <a:effectLst/>
-                <a:latin typeface="source-serif-pro"/>
-              </a:rPr>
-              <a:t>, </a:t>
-            </a:r>
-            <a:r>
-              <a:rPr lang="en-US" b="0" i="0" dirty="0" err="1">
-                <a:effectLst/>
-                <a:latin typeface="source-serif-pro"/>
-              </a:rPr>
-              <a:t>debt_consolidation</a:t>
-            </a:r>
-            <a:r>
-              <a:rPr lang="en-US" dirty="0">
-                <a:latin typeface="source-serif-pro"/>
-              </a:rPr>
-              <a:t>.</a:t>
-            </a:r>
-            <a:r>
-              <a:rPr lang="en-US" b="0" i="0" dirty="0">
-                <a:effectLst/>
-                <a:latin typeface="source-serif-pro"/>
-              </a:rPr>
-              <a:t> </a:t>
-            </a:r>
-            <a:r>
-              <a:rPr lang="en-US" b="0" i="0" dirty="0" err="1">
-                <a:effectLst/>
-                <a:latin typeface="source-serif-pro"/>
-              </a:rPr>
-              <a:t>Home_improvement</a:t>
-            </a:r>
-            <a:r>
-              <a:rPr lang="en-US" b="0" i="0" dirty="0">
-                <a:effectLst/>
-                <a:latin typeface="source-serif-pro"/>
-              </a:rPr>
-              <a:t> etc.</a:t>
+              <a:t> Home improvement etc.</a:t>
             </a:r>
           </a:p>
           <a:p>

</xml_diff>